<commit_message>
C programming Topic Wise PYQ update, Short notes of C update of ASCII
</commit_message>
<xml_diff>
--- a/GATE/C Programming/Short Notes.pptx
+++ b/GATE/C Programming/Short Notes.pptx
@@ -124,6 +124,10 @@
           <p14:sldIdLst>
             <p14:sldId id="257"/>
             <p14:sldId id="258"/>
+          </p14:sldIdLst>
+        </p14:section>
+        <p14:section name="ASCII" id="{D0D34BE9-A99C-4E96-B1E2-F571930462E4}">
+          <p14:sldIdLst>
             <p14:sldId id="259"/>
             <p14:sldId id="260"/>
             <p14:sldId id="261"/>
@@ -133,6 +137,9 @@
           </p14:sldIdLst>
         </p14:section>
       </p14:sectionLst>
+    </p:ext>
+    <p:ext uri="{EFAFB233-063F-42B5-8137-9DF3F51BA10A}">
+      <p15:sldGuideLst xmlns:p15="http://schemas.microsoft.com/office/powerpoint/2012/main"/>
     </p:ext>
   </p:extLst>
 </p:presentation>
@@ -287,7 +294,7 @@
           <a:p>
             <a:fld id="{C479B0C3-F5B5-4DF9-A8EC-944D0CE821C1}" type="datetimeFigureOut">
               <a:rPr lang="en-IN" smtClean="0"/>
-              <a:t>02-02-2026</a:t>
+              <a:t>03-02-2026</a:t>
             </a:fld>
             <a:endParaRPr lang="en-IN"/>
           </a:p>
@@ -487,7 +494,7 @@
           <a:p>
             <a:fld id="{C479B0C3-F5B5-4DF9-A8EC-944D0CE821C1}" type="datetimeFigureOut">
               <a:rPr lang="en-IN" smtClean="0"/>
-              <a:t>02-02-2026</a:t>
+              <a:t>03-02-2026</a:t>
             </a:fld>
             <a:endParaRPr lang="en-IN"/>
           </a:p>
@@ -697,7 +704,7 @@
           <a:p>
             <a:fld id="{C479B0C3-F5B5-4DF9-A8EC-944D0CE821C1}" type="datetimeFigureOut">
               <a:rPr lang="en-IN" smtClean="0"/>
-              <a:t>02-02-2026</a:t>
+              <a:t>03-02-2026</a:t>
             </a:fld>
             <a:endParaRPr lang="en-IN"/>
           </a:p>
@@ -897,7 +904,7 @@
           <a:p>
             <a:fld id="{C479B0C3-F5B5-4DF9-A8EC-944D0CE821C1}" type="datetimeFigureOut">
               <a:rPr lang="en-IN" smtClean="0"/>
-              <a:t>02-02-2026</a:t>
+              <a:t>03-02-2026</a:t>
             </a:fld>
             <a:endParaRPr lang="en-IN"/>
           </a:p>
@@ -1173,7 +1180,7 @@
           <a:p>
             <a:fld id="{C479B0C3-F5B5-4DF9-A8EC-944D0CE821C1}" type="datetimeFigureOut">
               <a:rPr lang="en-IN" smtClean="0"/>
-              <a:t>02-02-2026</a:t>
+              <a:t>03-02-2026</a:t>
             </a:fld>
             <a:endParaRPr lang="en-IN"/>
           </a:p>
@@ -1441,7 +1448,7 @@
           <a:p>
             <a:fld id="{C479B0C3-F5B5-4DF9-A8EC-944D0CE821C1}" type="datetimeFigureOut">
               <a:rPr lang="en-IN" smtClean="0"/>
-              <a:t>02-02-2026</a:t>
+              <a:t>03-02-2026</a:t>
             </a:fld>
             <a:endParaRPr lang="en-IN"/>
           </a:p>
@@ -1856,7 +1863,7 @@
           <a:p>
             <a:fld id="{C479B0C3-F5B5-4DF9-A8EC-944D0CE821C1}" type="datetimeFigureOut">
               <a:rPr lang="en-IN" smtClean="0"/>
-              <a:t>02-02-2026</a:t>
+              <a:t>03-02-2026</a:t>
             </a:fld>
             <a:endParaRPr lang="en-IN"/>
           </a:p>
@@ -1998,7 +2005,7 @@
           <a:p>
             <a:fld id="{C479B0C3-F5B5-4DF9-A8EC-944D0CE821C1}" type="datetimeFigureOut">
               <a:rPr lang="en-IN" smtClean="0"/>
-              <a:t>02-02-2026</a:t>
+              <a:t>03-02-2026</a:t>
             </a:fld>
             <a:endParaRPr lang="en-IN"/>
           </a:p>
@@ -2111,7 +2118,7 @@
           <a:p>
             <a:fld id="{C479B0C3-F5B5-4DF9-A8EC-944D0CE821C1}" type="datetimeFigureOut">
               <a:rPr lang="en-IN" smtClean="0"/>
-              <a:t>02-02-2026</a:t>
+              <a:t>03-02-2026</a:t>
             </a:fld>
             <a:endParaRPr lang="en-IN"/>
           </a:p>
@@ -2424,7 +2431,7 @@
           <a:p>
             <a:fld id="{C479B0C3-F5B5-4DF9-A8EC-944D0CE821C1}" type="datetimeFigureOut">
               <a:rPr lang="en-IN" smtClean="0"/>
-              <a:t>02-02-2026</a:t>
+              <a:t>03-02-2026</a:t>
             </a:fld>
             <a:endParaRPr lang="en-IN"/>
           </a:p>
@@ -2713,7 +2720,7 @@
           <a:p>
             <a:fld id="{C479B0C3-F5B5-4DF9-A8EC-944D0CE821C1}" type="datetimeFigureOut">
               <a:rPr lang="en-IN" smtClean="0"/>
-              <a:t>02-02-2026</a:t>
+              <a:t>03-02-2026</a:t>
             </a:fld>
             <a:endParaRPr lang="en-IN"/>
           </a:p>
@@ -2956,7 +2963,7 @@
           <a:p>
             <a:fld id="{C479B0C3-F5B5-4DF9-A8EC-944D0CE821C1}" type="datetimeFigureOut">
               <a:rPr lang="en-IN" smtClean="0"/>
-              <a:t>02-02-2026</a:t>
+              <a:t>03-02-2026</a:t>
             </a:fld>
             <a:endParaRPr lang="en-IN"/>
           </a:p>
@@ -3575,6 +3582,126 @@
           <a:chExt cx="0" cy="0"/>
         </a:xfrm>
       </p:grpSpPr>
+      <p:pic>
+        <p:nvPicPr>
+          <p:cNvPr id="3" name="Picture 2">
+            <a:extLst>
+              <a:ext uri="{FF2B5EF4-FFF2-40B4-BE49-F238E27FC236}">
+                <a16:creationId xmlns:a16="http://schemas.microsoft.com/office/drawing/2014/main" id="{0A919036-C131-4F23-B6A6-6E665D3E0E02}"/>
+              </a:ext>
+            </a:extLst>
+          </p:cNvPr>
+          <p:cNvPicPr>
+            <a:picLocks noChangeAspect="1"/>
+          </p:cNvPicPr>
+          <p:nvPr/>
+        </p:nvPicPr>
+        <p:blipFill>
+          <a:blip r:embed="rId2"/>
+          <a:stretch>
+            <a:fillRect/>
+          </a:stretch>
+        </p:blipFill>
+        <p:spPr>
+          <a:xfrm>
+            <a:off x="768808" y="552620"/>
+            <a:ext cx="3301477" cy="2245987"/>
+          </a:xfrm>
+          <a:prstGeom prst="rect">
+            <a:avLst/>
+          </a:prstGeom>
+        </p:spPr>
+      </p:pic>
+      <p:pic>
+        <p:nvPicPr>
+          <p:cNvPr id="5" name="Picture 4">
+            <a:extLst>
+              <a:ext uri="{FF2B5EF4-FFF2-40B4-BE49-F238E27FC236}">
+                <a16:creationId xmlns:a16="http://schemas.microsoft.com/office/drawing/2014/main" id="{AF1DF261-FA1D-4028-B404-93BB7003F30F}"/>
+              </a:ext>
+            </a:extLst>
+          </p:cNvPr>
+          <p:cNvPicPr>
+            <a:picLocks noChangeAspect="1"/>
+          </p:cNvPicPr>
+          <p:nvPr/>
+        </p:nvPicPr>
+        <p:blipFill>
+          <a:blip r:embed="rId3"/>
+          <a:stretch>
+            <a:fillRect/>
+          </a:stretch>
+        </p:blipFill>
+        <p:spPr>
+          <a:xfrm>
+            <a:off x="6650419" y="552620"/>
+            <a:ext cx="4036954" cy="2343056"/>
+          </a:xfrm>
+          <a:prstGeom prst="rect">
+            <a:avLst/>
+          </a:prstGeom>
+        </p:spPr>
+      </p:pic>
+      <p:pic>
+        <p:nvPicPr>
+          <p:cNvPr id="7" name="Picture 6">
+            <a:extLst>
+              <a:ext uri="{FF2B5EF4-FFF2-40B4-BE49-F238E27FC236}">
+                <a16:creationId xmlns:a16="http://schemas.microsoft.com/office/drawing/2014/main" id="{92B12A34-F2ED-4116-B2A0-A156812E216F}"/>
+              </a:ext>
+            </a:extLst>
+          </p:cNvPr>
+          <p:cNvPicPr>
+            <a:picLocks noChangeAspect="1"/>
+          </p:cNvPicPr>
+          <p:nvPr/>
+        </p:nvPicPr>
+        <p:blipFill>
+          <a:blip r:embed="rId4"/>
+          <a:stretch>
+            <a:fillRect/>
+          </a:stretch>
+        </p:blipFill>
+        <p:spPr>
+          <a:xfrm>
+            <a:off x="580168" y="3621493"/>
+            <a:ext cx="2454630" cy="2424201"/>
+          </a:xfrm>
+          <a:prstGeom prst="rect">
+            <a:avLst/>
+          </a:prstGeom>
+        </p:spPr>
+      </p:pic>
+      <p:pic>
+        <p:nvPicPr>
+          <p:cNvPr id="9" name="Picture 8">
+            <a:extLst>
+              <a:ext uri="{FF2B5EF4-FFF2-40B4-BE49-F238E27FC236}">
+                <a16:creationId xmlns:a16="http://schemas.microsoft.com/office/drawing/2014/main" id="{8BAFAFBA-EE12-4791-9934-7A317198CB43}"/>
+              </a:ext>
+            </a:extLst>
+          </p:cNvPr>
+          <p:cNvPicPr>
+            <a:picLocks noChangeAspect="1"/>
+          </p:cNvPicPr>
+          <p:nvPr/>
+        </p:nvPicPr>
+        <p:blipFill>
+          <a:blip r:embed="rId5"/>
+          <a:stretch>
+            <a:fillRect/>
+          </a:stretch>
+        </p:blipFill>
+        <p:spPr>
+          <a:xfrm>
+            <a:off x="4574624" y="3230965"/>
+            <a:ext cx="6115891" cy="2966857"/>
+          </a:xfrm>
+          <a:prstGeom prst="rect">
+            <a:avLst/>
+          </a:prstGeom>
+        </p:spPr>
+      </p:pic>
     </p:spTree>
     <p:extLst>
       <p:ext uri="{BB962C8B-B14F-4D97-AF65-F5344CB8AC3E}">

</xml_diff>